<commit_message>
Updated the powerpoint file
</commit_message>
<xml_diff>
--- a/Presentaties/week-3/Presentatie3.pptx
+++ b/Presentaties/week-3/Presentatie3.pptx
@@ -5,10 +5,10 @@
     <p:sldMasterId id="2147483950" r:id="rId1"/>
   </p:sldMasterIdLst>
   <p:notesMasterIdLst>
-    <p:notesMasterId r:id="rId13"/>
+    <p:notesMasterId r:id="rId14"/>
   </p:notesMasterIdLst>
   <p:handoutMasterIdLst>
-    <p:handoutMasterId r:id="rId14"/>
+    <p:handoutMasterId r:id="rId15"/>
   </p:handoutMasterIdLst>
   <p:sldIdLst>
     <p:sldId id="256" r:id="rId2"/>
@@ -16,12 +16,13 @@
     <p:sldId id="258" r:id="rId4"/>
     <p:sldId id="264" r:id="rId5"/>
     <p:sldId id="259" r:id="rId6"/>
-    <p:sldId id="266" r:id="rId7"/>
-    <p:sldId id="267" r:id="rId8"/>
-    <p:sldId id="268" r:id="rId9"/>
+    <p:sldId id="267" r:id="rId7"/>
+    <p:sldId id="268" r:id="rId8"/>
+    <p:sldId id="266" r:id="rId9"/>
     <p:sldId id="269" r:id="rId10"/>
-    <p:sldId id="260" r:id="rId11"/>
-    <p:sldId id="261" r:id="rId12"/>
+    <p:sldId id="270" r:id="rId11"/>
+    <p:sldId id="260" r:id="rId12"/>
+    <p:sldId id="261" r:id="rId13"/>
   </p:sldIdLst>
   <p:sldSz cx="9144000" cy="6858000" type="screen4x3"/>
   <p:notesSz cx="7010400" cy="9296400"/>
@@ -120,7 +121,35 @@
       </a:defRPr>
     </a:lvl9pPr>
   </p:defaultTextStyle>
+  <p:extLst>
+    <p:ext uri="{EFAFB233-063F-42B5-8137-9DF3F51BA10A}">
+      <p15:sldGuideLst xmlns:p15="http://schemas.microsoft.com/office/powerpoint/2012/main">
+        <p15:guide id="1" orient="horz" pos="2160">
+          <p15:clr>
+            <a:srgbClr val="A4A3A4"/>
+          </p15:clr>
+        </p15:guide>
+        <p15:guide id="2" pos="2880">
+          <p15:clr>
+            <a:srgbClr val="A4A3A4"/>
+          </p15:clr>
+        </p15:guide>
+      </p15:sldGuideLst>
+    </p:ext>
+  </p:extLst>
 </p:presentation>
+</file>
+
+<file path=ppt/commentAuthors.xml><?xml version="1.0" encoding="utf-8"?>
+<p:cmAuthorLst xmlns:a="http://schemas.openxmlformats.org/drawingml/2006/main" xmlns:r="http://schemas.openxmlformats.org/officeDocument/2006/relationships" xmlns:p="http://schemas.openxmlformats.org/presentationml/2006/main">
+  <p:cmAuthor id="1" name="Mark" initials="M" lastIdx="0" clrIdx="0">
+    <p:extLst>
+      <p:ext uri="{19B8F6BF-5375-455C-9EA6-DF929625EA0E}">
+        <p15:presenceInfo xmlns:p15="http://schemas.microsoft.com/office/powerpoint/2012/main" userId="Mark" providerId="None"/>
+      </p:ext>
+    </p:extLst>
+  </p:cmAuthor>
+</p:cmAuthorLst>
 </file>
 
 <file path=ppt/handoutMasters/handoutMaster1.xml><?xml version="1.0" encoding="utf-8"?>
@@ -205,7 +234,7 @@
           <a:p>
             <a:fld id="{EE624811-6FAD-D84C-9EA1-49C9B981D1D5}" type="datetimeFigureOut">
               <a:rPr lang="nl-NL" smtClean="0"/>
-              <a:t>02-12-15</a:t>
+              <a:t>9-12-2015</a:t>
             </a:fld>
             <a:endParaRPr lang="nl-NL"/>
           </a:p>
@@ -271,7 +300,7 @@
           <a:p>
             <a:fld id="{740F6B51-CE30-6D49-B8CE-8246CF475D59}" type="slidenum">
               <a:rPr lang="nl-NL" smtClean="0"/>
-              <a:t>‹nr.›</a:t>
+              <a:t>‹#›</a:t>
             </a:fld>
             <a:endParaRPr lang="nl-NL"/>
           </a:p>
@@ -371,7 +400,7 @@
           <a:p>
             <a:fld id="{59A787BA-5675-944D-A3B2-BBB7A3FF956B}" type="datetimeFigureOut">
               <a:rPr lang="nl-NL" smtClean="0"/>
-              <a:t>02-12-15</a:t>
+              <a:t>9-12-2015</a:t>
             </a:fld>
             <a:endParaRPr lang="nl-NL"/>
           </a:p>
@@ -530,7 +559,7 @@
           <a:p>
             <a:fld id="{76ABDE4D-A3B8-C84F-9330-8648B224B7E5}" type="slidenum">
               <a:rPr lang="nl-NL" smtClean="0"/>
-              <a:t>‹nr.›</a:t>
+              <a:t>‹#›</a:t>
             </a:fld>
             <a:endParaRPr lang="nl-NL"/>
           </a:p>
@@ -946,7 +975,7 @@
           <a:p>
             <a:fld id="{76ABDE4D-A3B8-C84F-9330-8648B224B7E5}" type="slidenum">
               <a:rPr lang="nl-NL" smtClean="0"/>
-              <a:t>6</a:t>
+              <a:t>8</a:t>
             </a:fld>
             <a:endParaRPr lang="nl-NL"/>
           </a:p>
@@ -1159,7 +1188,7 @@
           <a:p>
             <a:fld id="{198DAD66-A988-B74B-B760-9491AD051B46}" type="datetime1">
               <a:rPr lang="nl-NL" smtClean="0"/>
-              <a:t>02-12-15</a:t>
+              <a:t>9-12-2015</a:t>
             </a:fld>
             <a:endParaRPr lang="en-US"/>
           </a:p>
@@ -1202,7 +1231,7 @@
             <a:fld id="{6E2D2B3B-882E-40F3-A32F-6DD516915044}" type="slidenum">
               <a:rPr lang="en-US" smtClean="0"/>
               <a:pPr/>
-              <a:t>‹nr.›</a:t>
+              <a:t>‹#›</a:t>
             </a:fld>
             <a:endParaRPr lang="en-US" dirty="0"/>
           </a:p>
@@ -1325,7 +1354,7 @@
           <a:p>
             <a:fld id="{2AA2675F-7F81-F241-8C58-6BD9B7F67948}" type="datetime1">
               <a:rPr lang="nl-NL" smtClean="0"/>
-              <a:t>02-12-15</a:t>
+              <a:t>9-12-2015</a:t>
             </a:fld>
             <a:endParaRPr lang="en-US"/>
           </a:p>
@@ -1368,7 +1397,7 @@
             <a:fld id="{6E2D2B3B-882E-40F3-A32F-6DD516915044}" type="slidenum">
               <a:rPr lang="en-US" smtClean="0"/>
               <a:pPr/>
-              <a:t>‹nr.›</a:t>
+              <a:t>‹#›</a:t>
             </a:fld>
             <a:endParaRPr lang="en-US"/>
           </a:p>
@@ -1501,7 +1530,7 @@
           <a:p>
             <a:fld id="{E7FC97C7-7090-124B-9F3D-8FADFAC31045}" type="datetime1">
               <a:rPr lang="nl-NL" smtClean="0"/>
-              <a:t>02-12-15</a:t>
+              <a:t>9-12-2015</a:t>
             </a:fld>
             <a:endParaRPr lang="en-US"/>
           </a:p>
@@ -1544,7 +1573,7 @@
             <a:fld id="{6E2D2B3B-882E-40F3-A32F-6DD516915044}" type="slidenum">
               <a:rPr lang="en-US" smtClean="0"/>
               <a:pPr/>
-              <a:t>‹nr.›</a:t>
+              <a:t>‹#›</a:t>
             </a:fld>
             <a:endParaRPr lang="en-US"/>
           </a:p>
@@ -1667,7 +1696,7 @@
           <a:p>
             <a:fld id="{DBC0140F-E285-034E-9BDB-7A63AA6A523E}" type="datetime1">
               <a:rPr lang="nl-NL" smtClean="0"/>
-              <a:t>02-12-15</a:t>
+              <a:t>9-12-2015</a:t>
             </a:fld>
             <a:endParaRPr lang="en-US"/>
           </a:p>
@@ -1710,7 +1739,7 @@
             <a:fld id="{6E2D2B3B-882E-40F3-A32F-6DD516915044}" type="slidenum">
               <a:rPr lang="en-US" smtClean="0"/>
               <a:pPr/>
-              <a:t>‹nr.›</a:t>
+              <a:t>‹#›</a:t>
             </a:fld>
             <a:endParaRPr lang="en-US"/>
           </a:p>
@@ -1909,7 +1938,7 @@
           <a:p>
             <a:fld id="{02AD0581-268F-D348-8AAC-83DC8A712DED}" type="datetime1">
               <a:rPr lang="nl-NL" smtClean="0"/>
-              <a:t>02-12-15</a:t>
+              <a:t>9-12-2015</a:t>
             </a:fld>
             <a:endParaRPr lang="en-US"/>
           </a:p>
@@ -1952,7 +1981,7 @@
             <a:fld id="{6E2D2B3B-882E-40F3-A32F-6DD516915044}" type="slidenum">
               <a:rPr lang="en-US" smtClean="0"/>
               <a:pPr/>
-              <a:t>‹nr.›</a:t>
+              <a:t>‹#›</a:t>
             </a:fld>
             <a:endParaRPr lang="en-US"/>
           </a:p>
@@ -2193,7 +2222,7 @@
           <a:p>
             <a:fld id="{226B052C-F7AA-514A-B062-ABC234148B1B}" type="datetime1">
               <a:rPr lang="nl-NL" smtClean="0"/>
-              <a:t>02-12-15</a:t>
+              <a:t>9-12-2015</a:t>
             </a:fld>
             <a:endParaRPr lang="en-US"/>
           </a:p>
@@ -2236,7 +2265,7 @@
             <a:fld id="{6E2D2B3B-882E-40F3-A32F-6DD516915044}" type="slidenum">
               <a:rPr lang="en-US" smtClean="0"/>
               <a:pPr/>
-              <a:t>‹nr.›</a:t>
+              <a:t>‹#›</a:t>
             </a:fld>
             <a:endParaRPr lang="en-US"/>
           </a:p>
@@ -2623,7 +2652,7 @@
           <a:p>
             <a:fld id="{0EBAE52B-97B4-1946-A252-B866172949DB}" type="datetime1">
               <a:rPr lang="nl-NL" smtClean="0"/>
-              <a:t>02-12-15</a:t>
+              <a:t>9-12-2015</a:t>
             </a:fld>
             <a:endParaRPr lang="en-US"/>
           </a:p>
@@ -2666,7 +2695,7 @@
             <a:fld id="{6E2D2B3B-882E-40F3-A32F-6DD516915044}" type="slidenum">
               <a:rPr lang="en-US" smtClean="0"/>
               <a:pPr/>
-              <a:t>‹nr.›</a:t>
+              <a:t>‹#›</a:t>
             </a:fld>
             <a:endParaRPr lang="en-US"/>
           </a:p>
@@ -2737,7 +2766,7 @@
           <a:p>
             <a:fld id="{B4553C1F-9CFB-4548-B096-2987B4460928}" type="datetime1">
               <a:rPr lang="nl-NL" smtClean="0"/>
-              <a:t>02-12-15</a:t>
+              <a:t>9-12-2015</a:t>
             </a:fld>
             <a:endParaRPr lang="en-US"/>
           </a:p>
@@ -2780,7 +2809,7 @@
             <a:fld id="{6E2D2B3B-882E-40F3-A32F-6DD516915044}" type="slidenum">
               <a:rPr lang="en-US" smtClean="0"/>
               <a:pPr/>
-              <a:t>‹nr.›</a:t>
+              <a:t>‹#›</a:t>
             </a:fld>
             <a:endParaRPr lang="en-US"/>
           </a:p>
@@ -2828,7 +2857,7 @@
           <a:p>
             <a:fld id="{52D97254-9109-9D46-A699-B4B501896CB1}" type="datetime1">
               <a:rPr lang="nl-NL" smtClean="0"/>
-              <a:t>02-12-15</a:t>
+              <a:t>9-12-2015</a:t>
             </a:fld>
             <a:endParaRPr lang="en-US"/>
           </a:p>
@@ -2871,7 +2900,7 @@
             <a:fld id="{6E2D2B3B-882E-40F3-A32F-6DD516915044}" type="slidenum">
               <a:rPr lang="en-US" smtClean="0"/>
               <a:pPr/>
-              <a:t>‹nr.›</a:t>
+              <a:t>‹#›</a:t>
             </a:fld>
             <a:endParaRPr lang="en-US"/>
           </a:p>
@@ -3018,7 +3047,7 @@
           <a:p>
             <a:fld id="{D2E060CD-4093-D64F-8579-738E4787A822}" type="datetime1">
               <a:rPr lang="nl-NL" smtClean="0"/>
-              <a:t>02-12-15</a:t>
+              <a:t>9-12-2015</a:t>
             </a:fld>
             <a:endParaRPr lang="en-US"/>
           </a:p>
@@ -3061,7 +3090,7 @@
             <a:fld id="{6E2D2B3B-882E-40F3-A32F-6DD516915044}" type="slidenum">
               <a:rPr lang="en-US" smtClean="0"/>
               <a:pPr/>
-              <a:t>‹nr.›</a:t>
+              <a:t>‹#›</a:t>
             </a:fld>
             <a:endParaRPr lang="en-US"/>
           </a:p>
@@ -3337,7 +3366,7 @@
           <a:p>
             <a:fld id="{4C567F44-F26B-6945-A4AD-2707F1FF0F23}" type="datetime1">
               <a:rPr lang="nl-NL" smtClean="0"/>
-              <a:t>02-12-15</a:t>
+              <a:t>9-12-2015</a:t>
             </a:fld>
             <a:endParaRPr lang="en-US" dirty="0"/>
           </a:p>
@@ -3361,7 +3390,7 @@
             <a:fld id="{6E2D2B3B-882E-40F3-A32F-6DD516915044}" type="slidenum">
               <a:rPr lang="en-US" smtClean="0"/>
               <a:pPr/>
-              <a:t>‹nr.›</a:t>
+              <a:t>‹#›</a:t>
             </a:fld>
             <a:endParaRPr lang="en-US" dirty="0"/>
           </a:p>
@@ -3644,7 +3673,7 @@
             <a:fld id="{6E2D2B3B-882E-40F3-A32F-6DD516915044}" type="slidenum">
               <a:rPr lang="en-US" smtClean="0"/>
               <a:pPr/>
-              <a:t>‹nr.›</a:t>
+              <a:t>‹#›</a:t>
             </a:fld>
             <a:endParaRPr lang="en-US" dirty="0"/>
           </a:p>
@@ -3718,7 +3747,7 @@
           <a:p>
             <a:fld id="{3DE2D332-4CE3-B646-A196-1AAA9608B4CD}" type="datetime1">
               <a:rPr lang="nl-NL" smtClean="0"/>
-              <a:t>02-12-15</a:t>
+              <a:t>9-12-2015</a:t>
             </a:fld>
             <a:endParaRPr lang="en-US" dirty="0"/>
           </a:p>
@@ -4167,7 +4196,7 @@
   <p:timing>
     <p:tnLst>
       <p:par>
-        <p:cTn xmlns:p14="http://schemas.microsoft.com/office/powerpoint/2010/main" id="1" dur="indefinite" restart="never" nodeType="tmRoot"/>
+        <p:cTn id="1" dur="indefinite" restart="never" nodeType="tmRoot"/>
       </p:par>
     </p:tnLst>
   </p:timing>
@@ -4193,7 +4222,7 @@
       </p:grpSpPr>
       <p:sp>
         <p:nvSpPr>
-          <p:cNvPr id="2" name="Titel 1"/>
+          <p:cNvPr id="2" name="Title 1"/>
           <p:cNvSpPr>
             <a:spLocks noGrp="1"/>
           </p:cNvSpPr>
@@ -4206,17 +4235,37 @@
           <a:bodyPr/>
           <a:lstStyle/>
           <a:p>
-            <a:r>
-              <a:rPr lang="nl-NL" dirty="0" smtClean="0"/>
-              <a:t> </a:t>
-            </a:r>
-            <a:endParaRPr lang="nl-NL" dirty="0"/>
+            <a:endParaRPr lang="nl-NL"/>
+          </a:p>
+        </p:txBody>
+      </p:sp>
+      <p:sp>
+        <p:nvSpPr>
+          <p:cNvPr id="4" name="Slide Number Placeholder 3"/>
+          <p:cNvSpPr>
+            <a:spLocks noGrp="1"/>
+          </p:cNvSpPr>
+          <p:nvPr>
+            <p:ph type="sldNum" sz="quarter" idx="12"/>
+          </p:nvPr>
+        </p:nvSpPr>
+        <p:spPr/>
+        <p:txBody>
+          <a:bodyPr/>
+          <a:lstStyle/>
+          <a:p>
+            <a:fld id="{6E2D2B3B-882E-40F3-A32F-6DD516915044}" type="slidenum">
+              <a:rPr lang="en-US" smtClean="0"/>
+              <a:pPr/>
+              <a:t>10</a:t>
+            </a:fld>
+            <a:endParaRPr lang="en-US"/>
           </a:p>
         </p:txBody>
       </p:sp>
       <p:pic>
         <p:nvPicPr>
-          <p:cNvPr id="4" name="Tijdelijke aanduiding voor inhoud 3"/>
+          <p:cNvPr id="5" name="Tijdelijke aanduiding voor inhoud 4" descr="Schermafbeelding 2015-12-02 om 20.52.46.png"/>
           <p:cNvPicPr>
             <a:picLocks noGrp="1" noChangeAspect="1"/>
           </p:cNvPicPr>
@@ -4225,47 +4274,91 @@
           </p:nvPr>
         </p:nvPicPr>
         <p:blipFill>
-          <a:blip r:embed="rId2"/>
-          <a:srcRect l="-2972" r="-2972"/>
+          <a:blip r:embed="rId2" cstate="email">
+            <a:extLst>
+              <a:ext uri="{28A0092B-C50C-407E-A947-70E740481C1C}">
+                <a14:useLocalDpi xmlns:a14="http://schemas.microsoft.com/office/drawing/2010/main" val="0"/>
+              </a:ext>
+            </a:extLst>
+          </a:blip>
+          <a:srcRect t="5967" b="5967"/>
           <a:stretch>
             <a:fillRect/>
           </a:stretch>
         </p:blipFill>
         <p:spPr>
           <a:xfrm>
-            <a:off x="326269" y="274638"/>
-            <a:ext cx="5815240" cy="3663601"/>
+            <a:off x="457200" y="1741577"/>
+            <a:ext cx="3348680" cy="2109661"/>
           </a:xfrm>
         </p:spPr>
       </p:pic>
-      <p:sp>
-        <p:nvSpPr>
-          <p:cNvPr id="3" name="Tijdelijke aanduiding voor dianummer 2"/>
-          <p:cNvSpPr>
-            <a:spLocks noGrp="1"/>
-          </p:cNvSpPr>
-          <p:nvPr>
-            <p:ph type="sldNum" sz="quarter" idx="12"/>
-          </p:nvPr>
-        </p:nvSpPr>
-        <p:spPr/>
-        <p:txBody>
-          <a:bodyPr/>
-          <a:lstStyle/>
-          <a:p>
-            <a:fld id="{6E2D2B3B-882E-40F3-A32F-6DD516915044}" type="slidenum">
-              <a:rPr lang="en-US" smtClean="0"/>
-              <a:pPr/>
-              <a:t>10</a:t>
-            </a:fld>
-            <a:endParaRPr lang="en-US"/>
-          </a:p>
-        </p:txBody>
-      </p:sp>
+      <p:pic>
+        <p:nvPicPr>
+          <p:cNvPr id="6" name="Tijdelijke aanduiding voor inhoud 4" descr="Schermafbeelding 2015-12-02 om 20.52.56.png"/>
+          <p:cNvPicPr>
+            <a:picLocks noChangeAspect="1"/>
+          </p:cNvPicPr>
+          <p:nvPr/>
+        </p:nvPicPr>
+        <p:blipFill>
+          <a:blip r:embed="rId3" cstate="email">
+            <a:extLst>
+              <a:ext uri="{28A0092B-C50C-407E-A947-70E740481C1C}">
+                <a14:useLocalDpi xmlns:a14="http://schemas.microsoft.com/office/drawing/2010/main" val="0"/>
+              </a:ext>
+            </a:extLst>
+          </a:blip>
+          <a:srcRect t="5782" b="5782"/>
+          <a:stretch>
+            <a:fillRect/>
+          </a:stretch>
+        </p:blipFill>
+        <p:spPr>
+          <a:xfrm>
+            <a:off x="4555863" y="1741577"/>
+            <a:ext cx="3348680" cy="2109668"/>
+          </a:xfrm>
+          <a:prstGeom prst="rect">
+            <a:avLst/>
+          </a:prstGeom>
+        </p:spPr>
+      </p:pic>
+      <p:pic>
+        <p:nvPicPr>
+          <p:cNvPr id="7" name="Tijdelijke aanduiding voor inhoud 4" descr="Schermafbeelding 2015-12-02 om 20.53.08.png"/>
+          <p:cNvPicPr>
+            <a:picLocks noChangeAspect="1"/>
+          </p:cNvPicPr>
+          <p:nvPr/>
+        </p:nvPicPr>
+        <p:blipFill>
+          <a:blip r:embed="rId4" cstate="email">
+            <a:extLst>
+              <a:ext uri="{28A0092B-C50C-407E-A947-70E740481C1C}">
+                <a14:useLocalDpi xmlns:a14="http://schemas.microsoft.com/office/drawing/2010/main" val="0"/>
+              </a:ext>
+            </a:extLst>
+          </a:blip>
+          <a:srcRect t="5832" b="5832"/>
+          <a:stretch>
+            <a:fillRect/>
+          </a:stretch>
+        </p:blipFill>
+        <p:spPr>
+          <a:xfrm>
+            <a:off x="2592860" y="4175177"/>
+            <a:ext cx="3348680" cy="2109668"/>
+          </a:xfrm>
+          <a:prstGeom prst="rect">
+            <a:avLst/>
+          </a:prstGeom>
+        </p:spPr>
+      </p:pic>
     </p:spTree>
     <p:extLst>
       <p:ext uri="{BB962C8B-B14F-4D97-AF65-F5344CB8AC3E}">
-        <p14:creationId xmlns:p14="http://schemas.microsoft.com/office/powerpoint/2010/main" val="273736175"/>
+        <p14:creationId xmlns:p14="http://schemas.microsoft.com/office/powerpoint/2010/main" val="2899141594"/>
       </p:ext>
     </p:extLst>
   </p:cSld>
@@ -4275,7 +4368,7 @@
   <p:timing>
     <p:tnLst>
       <p:par>
-        <p:cTn xmlns:p14="http://schemas.microsoft.com/office/powerpoint/2010/main" id="1" dur="indefinite" restart="never" nodeType="tmRoot"/>
+        <p:cTn id="1" dur="indefinite" restart="never" nodeType="tmRoot"/>
       </p:par>
     </p:tnLst>
   </p:timing>
@@ -4316,6 +4409,114 @@
           <a:p>
             <a:r>
               <a:rPr lang="nl-NL" dirty="0" smtClean="0"/>
+              <a:t> </a:t>
+            </a:r>
+            <a:endParaRPr lang="nl-NL" dirty="0"/>
+          </a:p>
+        </p:txBody>
+      </p:sp>
+      <p:pic>
+        <p:nvPicPr>
+          <p:cNvPr id="4" name="Tijdelijke aanduiding voor inhoud 3"/>
+          <p:cNvPicPr>
+            <a:picLocks noGrp="1" noChangeAspect="1"/>
+          </p:cNvPicPr>
+          <p:nvPr>
+            <p:ph idx="1"/>
+          </p:nvPr>
+        </p:nvPicPr>
+        <p:blipFill>
+          <a:blip r:embed="rId2"/>
+          <a:srcRect l="-2972" r="-2972"/>
+          <a:stretch>
+            <a:fillRect/>
+          </a:stretch>
+        </p:blipFill>
+        <p:spPr>
+          <a:xfrm>
+            <a:off x="326269" y="274638"/>
+            <a:ext cx="5815240" cy="3663601"/>
+          </a:xfrm>
+        </p:spPr>
+      </p:pic>
+      <p:sp>
+        <p:nvSpPr>
+          <p:cNvPr id="3" name="Tijdelijke aanduiding voor dianummer 2"/>
+          <p:cNvSpPr>
+            <a:spLocks noGrp="1"/>
+          </p:cNvSpPr>
+          <p:nvPr>
+            <p:ph type="sldNum" sz="quarter" idx="12"/>
+          </p:nvPr>
+        </p:nvSpPr>
+        <p:spPr/>
+        <p:txBody>
+          <a:bodyPr/>
+          <a:lstStyle/>
+          <a:p>
+            <a:fld id="{6E2D2B3B-882E-40F3-A32F-6DD516915044}" type="slidenum">
+              <a:rPr lang="en-US" smtClean="0"/>
+              <a:pPr/>
+              <a:t>11</a:t>
+            </a:fld>
+            <a:endParaRPr lang="en-US"/>
+          </a:p>
+        </p:txBody>
+      </p:sp>
+    </p:spTree>
+    <p:extLst>
+      <p:ext uri="{BB962C8B-B14F-4D97-AF65-F5344CB8AC3E}">
+        <p14:creationId xmlns:p14="http://schemas.microsoft.com/office/powerpoint/2010/main" val="273736175"/>
+      </p:ext>
+    </p:extLst>
+  </p:cSld>
+  <p:clrMapOvr>
+    <a:masterClrMapping/>
+  </p:clrMapOvr>
+  <p:timing>
+    <p:tnLst>
+      <p:par>
+        <p:cTn id="1" dur="indefinite" restart="never" nodeType="tmRoot"/>
+      </p:par>
+    </p:tnLst>
+  </p:timing>
+</p:sld>
+</file>
+
+<file path=ppt/slides/slide12.xml><?xml version="1.0" encoding="utf-8"?>
+<p:sld xmlns:a="http://schemas.openxmlformats.org/drawingml/2006/main" xmlns:r="http://schemas.openxmlformats.org/officeDocument/2006/relationships" xmlns:p="http://schemas.openxmlformats.org/presentationml/2006/main">
+  <p:cSld>
+    <p:spTree>
+      <p:nvGrpSpPr>
+        <p:cNvPr id="1" name=""/>
+        <p:cNvGrpSpPr/>
+        <p:nvPr/>
+      </p:nvGrpSpPr>
+      <p:grpSpPr>
+        <a:xfrm>
+          <a:off x="0" y="0"/>
+          <a:ext cx="0" cy="0"/>
+          <a:chOff x="0" y="0"/>
+          <a:chExt cx="0" cy="0"/>
+        </a:xfrm>
+      </p:grpSpPr>
+      <p:sp>
+        <p:nvSpPr>
+          <p:cNvPr id="2" name="Titel 1"/>
+          <p:cNvSpPr>
+            <a:spLocks noGrp="1"/>
+          </p:cNvSpPr>
+          <p:nvPr>
+            <p:ph type="title"/>
+          </p:nvPr>
+        </p:nvSpPr>
+        <p:spPr/>
+        <p:txBody>
+          <a:bodyPr/>
+          <a:lstStyle/>
+          <a:p>
+            <a:r>
+              <a:rPr lang="nl-NL" dirty="0" smtClean="0"/>
               <a:t>Vragen en/of opmerkingen</a:t>
             </a:r>
             <a:endParaRPr lang="nl-NL" dirty="0"/>
@@ -4359,7 +4560,7 @@
             <a:fld id="{6E2D2B3B-882E-40F3-A32F-6DD516915044}" type="slidenum">
               <a:rPr lang="en-US" smtClean="0"/>
               <a:pPr/>
-              <a:t>11</a:t>
+              <a:t>12</a:t>
             </a:fld>
             <a:endParaRPr lang="en-US"/>
           </a:p>
@@ -4378,7 +4579,7 @@
   <p:timing>
     <p:tnLst>
       <p:par>
-        <p:cTn xmlns:p14="http://schemas.microsoft.com/office/powerpoint/2010/main" id="1" dur="indefinite" restart="never" nodeType="tmRoot"/>
+        <p:cTn id="1" dur="indefinite" restart="never" nodeType="tmRoot"/>
       </p:par>
     </p:tnLst>
   </p:timing>
@@ -4505,7 +4706,7 @@
   <p:timing>
     <p:tnLst>
       <p:par>
-        <p:cTn xmlns:p14="http://schemas.microsoft.com/office/powerpoint/2010/main" id="1" dur="indefinite" restart="never" nodeType="tmRoot"/>
+        <p:cTn id="1" dur="indefinite" restart="never" nodeType="tmRoot"/>
       </p:par>
     </p:tnLst>
   </p:timing>
@@ -4657,7 +4858,7 @@
   <p:timing>
     <p:tnLst>
       <p:par>
-        <p:cTn xmlns:p14="http://schemas.microsoft.com/office/powerpoint/2010/main" id="1" dur="indefinite" restart="never" nodeType="tmRoot"/>
+        <p:cTn id="1" dur="indefinite" restart="never" nodeType="tmRoot"/>
       </p:par>
     </p:tnLst>
   </p:timing>
@@ -4771,7 +4972,7 @@
   <p:timing>
     <p:tnLst>
       <p:par>
-        <p:cTn xmlns:p14="http://schemas.microsoft.com/office/powerpoint/2010/main" id="1" dur="indefinite" restart="never" nodeType="tmRoot"/>
+        <p:cTn id="1" dur="indefinite" restart="never" nodeType="tmRoot"/>
       </p:par>
     </p:tnLst>
   </p:timing>
@@ -4837,7 +5038,7 @@
           </p:nvPr>
         </p:nvPicPr>
         <p:blipFill>
-          <a:blip r:embed="rId2">
+          <a:blip r:embed="rId2" cstate="email">
             <a:extLst>
               <a:ext uri="{28A0092B-C50C-407E-A947-70E740481C1C}">
                 <a14:useLocalDpi xmlns:a14="http://schemas.microsoft.com/office/drawing/2010/main" val="0"/>
@@ -4888,7 +5089,7 @@
   <p:timing>
     <p:tnLst>
       <p:par>
-        <p:cTn xmlns:p14="http://schemas.microsoft.com/office/powerpoint/2010/main" id="1" dur="indefinite" restart="never" nodeType="tmRoot"/>
+        <p:cTn id="1" dur="indefinite" restart="never" nodeType="tmRoot"/>
       </p:par>
     </p:tnLst>
   </p:timing>
@@ -4929,7 +5130,7 @@
           <a:p>
             <a:r>
               <a:rPr lang="nl-NL" dirty="0" smtClean="0"/>
-              <a:t>A*</a:t>
+              <a:t>Dijkstra-Alg</a:t>
             </a:r>
             <a:endParaRPr lang="nl-NL" dirty="0"/>
           </a:p>
@@ -4937,7 +5138,7 @@
       </p:sp>
       <p:pic>
         <p:nvPicPr>
-          <p:cNvPr id="5" name="Tijdelijke aanduiding voor inhoud 4"/>
+          <p:cNvPr id="5" name="Tijdelijke aanduiding voor inhoud 4" descr="Schermafbeelding 2015-12-02 om 20.52.46.png"/>
           <p:cNvPicPr>
             <a:picLocks noGrp="1" noChangeAspect="1"/>
           </p:cNvPicPr>
@@ -4946,16 +5147,22 @@
           </p:nvPr>
         </p:nvPicPr>
         <p:blipFill>
-          <a:blip r:embed="rId3"/>
-          <a:srcRect l="-29365" r="-29365"/>
+          <a:blip r:embed="rId2">
+            <a:extLst>
+              <a:ext uri="{28A0092B-C50C-407E-A947-70E740481C1C}">
+                <a14:useLocalDpi xmlns:a14="http://schemas.microsoft.com/office/drawing/2010/main" val="0"/>
+              </a:ext>
+            </a:extLst>
+          </a:blip>
+          <a:srcRect t="5967" b="5967"/>
           <a:stretch>
             <a:fillRect/>
           </a:stretch>
         </p:blipFill>
         <p:spPr>
           <a:xfrm>
-            <a:off x="1563182" y="1826116"/>
-            <a:ext cx="7815768" cy="4923934"/>
+            <a:off x="457200" y="1417638"/>
+            <a:ext cx="7620000" cy="4800600"/>
           </a:xfrm>
         </p:spPr>
       </p:pic>
@@ -4986,7 +5193,7 @@
     </p:spTree>
     <p:extLst>
       <p:ext uri="{BB962C8B-B14F-4D97-AF65-F5344CB8AC3E}">
-        <p14:creationId xmlns:p14="http://schemas.microsoft.com/office/powerpoint/2010/main" val="1301141737"/>
+        <p14:creationId xmlns:p14="http://schemas.microsoft.com/office/powerpoint/2010/main" val="2717740856"/>
       </p:ext>
     </p:extLst>
   </p:cSld>
@@ -4996,7 +5203,7 @@
   <p:timing>
     <p:tnLst>
       <p:par>
-        <p:cTn xmlns:p14="http://schemas.microsoft.com/office/powerpoint/2010/main" id="1" dur="indefinite" restart="never" nodeType="tmRoot"/>
+        <p:cTn id="1" dur="indefinite" restart="never" nodeType="tmRoot"/>
       </p:par>
     </p:tnLst>
   </p:timing>
@@ -5035,13 +5242,17 @@
           <a:bodyPr/>
           <a:lstStyle/>
           <a:p>
-            <a:endParaRPr lang="nl-NL"/>
+            <a:r>
+              <a:rPr lang="nl-NL" dirty="0" smtClean="0"/>
+              <a:t>Best First Search-alg</a:t>
+            </a:r>
+            <a:endParaRPr lang="nl-NL" dirty="0"/>
           </a:p>
         </p:txBody>
       </p:sp>
       <p:pic>
         <p:nvPicPr>
-          <p:cNvPr id="5" name="Tijdelijke aanduiding voor inhoud 4" descr="Schermafbeelding 2015-12-02 om 20.52.46.png"/>
+          <p:cNvPr id="5" name="Tijdelijke aanduiding voor inhoud 4" descr="Schermafbeelding 2015-12-02 om 20.52.56.png"/>
           <p:cNvPicPr>
             <a:picLocks noGrp="1" noChangeAspect="1"/>
           </p:cNvPicPr>
@@ -5057,14 +5268,14 @@
               </a:ext>
             </a:extLst>
           </a:blip>
-          <a:srcRect t="5967" b="5967"/>
+          <a:srcRect t="5782" b="5782"/>
           <a:stretch>
             <a:fillRect/>
           </a:stretch>
         </p:blipFill>
         <p:spPr>
           <a:xfrm>
-            <a:off x="457200" y="848360"/>
+            <a:off x="457200" y="1417638"/>
             <a:ext cx="7620000" cy="4800600"/>
           </a:xfrm>
         </p:spPr>
@@ -5096,7 +5307,7 @@
     </p:spTree>
     <p:extLst>
       <p:ext uri="{BB962C8B-B14F-4D97-AF65-F5344CB8AC3E}">
-        <p14:creationId xmlns:p14="http://schemas.microsoft.com/office/powerpoint/2010/main" val="2717740856"/>
+        <p14:creationId xmlns:p14="http://schemas.microsoft.com/office/powerpoint/2010/main" val="2056091010"/>
       </p:ext>
     </p:extLst>
   </p:cSld>
@@ -5106,7 +5317,7 @@
   <p:timing>
     <p:tnLst>
       <p:par>
-        <p:cTn xmlns:p14="http://schemas.microsoft.com/office/powerpoint/2010/main" id="1" dur="indefinite" restart="never" nodeType="tmRoot"/>
+        <p:cTn id="1" dur="indefinite" restart="never" nodeType="tmRoot"/>
       </p:par>
     </p:tnLst>
   </p:timing>
@@ -5145,68 +5356,85 @@
           <a:bodyPr/>
           <a:lstStyle/>
           <a:p>
+            <a:r>
+              <a:rPr lang="nl-NL" dirty="0" smtClean="0"/>
+              <a:t>A-star (A*)</a:t>
+            </a:r>
+            <a:endParaRPr lang="nl-NL" dirty="0"/>
+          </a:p>
+        </p:txBody>
+      </p:sp>
+      <p:sp>
+        <p:nvSpPr>
+          <p:cNvPr id="4" name="Tijdelijke aanduiding voor dianummer 3"/>
+          <p:cNvSpPr>
+            <a:spLocks noGrp="1"/>
+          </p:cNvSpPr>
+          <p:nvPr>
+            <p:ph type="sldNum" sz="quarter" idx="12"/>
+          </p:nvPr>
+        </p:nvSpPr>
+        <p:spPr/>
+        <p:txBody>
+          <a:bodyPr/>
+          <a:lstStyle/>
+          <a:p>
+            <a:fld id="{6E2D2B3B-882E-40F3-A32F-6DD516915044}" type="slidenum">
+              <a:rPr lang="en-US" smtClean="0"/>
+              <a:pPr/>
+              <a:t>8</a:t>
+            </a:fld>
+            <a:endParaRPr lang="en-US"/>
+          </a:p>
+        </p:txBody>
+      </p:sp>
+      <p:sp>
+        <p:nvSpPr>
+          <p:cNvPr id="3" name="Content Placeholder 2"/>
+          <p:cNvSpPr>
+            <a:spLocks noGrp="1"/>
+          </p:cNvSpPr>
+          <p:nvPr>
+            <p:ph idx="1"/>
+          </p:nvPr>
+        </p:nvSpPr>
+        <p:spPr/>
+        <p:txBody>
+          <a:bodyPr/>
+          <a:lstStyle/>
+          <a:p>
             <a:endParaRPr lang="nl-NL"/>
           </a:p>
         </p:txBody>
       </p:sp>
       <p:pic>
         <p:nvPicPr>
-          <p:cNvPr id="5" name="Tijdelijke aanduiding voor inhoud 4" descr="Schermafbeelding 2015-12-02 om 20.52.56.png"/>
+          <p:cNvPr id="6" name="Picture 5"/>
           <p:cNvPicPr>
-            <a:picLocks noGrp="1" noChangeAspect="1"/>
+            <a:picLocks noChangeAspect="1"/>
           </p:cNvPicPr>
-          <p:nvPr>
-            <p:ph idx="1"/>
-          </p:nvPr>
+          <p:nvPr/>
         </p:nvPicPr>
         <p:blipFill>
-          <a:blip r:embed="rId2">
-            <a:extLst>
-              <a:ext uri="{28A0092B-C50C-407E-A947-70E740481C1C}">
-                <a14:useLocalDpi xmlns:a14="http://schemas.microsoft.com/office/drawing/2010/main" val="0"/>
-              </a:ext>
-            </a:extLst>
-          </a:blip>
-          <a:srcRect t="5782" b="5782"/>
+          <a:blip r:embed="rId3"/>
           <a:stretch>
             <a:fillRect/>
           </a:stretch>
         </p:blipFill>
         <p:spPr>
           <a:xfrm>
-            <a:off x="457200" y="848360"/>
-            <a:ext cx="7620000" cy="4800600"/>
+            <a:off x="1487889" y="1417638"/>
+            <a:ext cx="5558622" cy="5311994"/>
           </a:xfrm>
+          <a:prstGeom prst="rect">
+            <a:avLst/>
+          </a:prstGeom>
         </p:spPr>
       </p:pic>
-      <p:sp>
-        <p:nvSpPr>
-          <p:cNvPr id="4" name="Tijdelijke aanduiding voor dianummer 3"/>
-          <p:cNvSpPr>
-            <a:spLocks noGrp="1"/>
-          </p:cNvSpPr>
-          <p:nvPr>
-            <p:ph type="sldNum" sz="quarter" idx="12"/>
-          </p:nvPr>
-        </p:nvSpPr>
-        <p:spPr/>
-        <p:txBody>
-          <a:bodyPr/>
-          <a:lstStyle/>
-          <a:p>
-            <a:fld id="{6E2D2B3B-882E-40F3-A32F-6DD516915044}" type="slidenum">
-              <a:rPr lang="en-US" smtClean="0"/>
-              <a:pPr/>
-              <a:t>8</a:t>
-            </a:fld>
-            <a:endParaRPr lang="en-US"/>
-          </a:p>
-        </p:txBody>
-      </p:sp>
     </p:spTree>
     <p:extLst>
       <p:ext uri="{BB962C8B-B14F-4D97-AF65-F5344CB8AC3E}">
-        <p14:creationId xmlns:p14="http://schemas.microsoft.com/office/powerpoint/2010/main" val="2056091010"/>
+        <p14:creationId xmlns:p14="http://schemas.microsoft.com/office/powerpoint/2010/main" val="1301141737"/>
       </p:ext>
     </p:extLst>
   </p:cSld>
@@ -5216,7 +5444,7 @@
   <p:timing>
     <p:tnLst>
       <p:par>
-        <p:cTn xmlns:p14="http://schemas.microsoft.com/office/powerpoint/2010/main" id="1" dur="indefinite" restart="never" nodeType="tmRoot"/>
+        <p:cTn id="1" dur="indefinite" restart="never" nodeType="tmRoot"/>
       </p:par>
     </p:tnLst>
   </p:timing>
@@ -5255,7 +5483,11 @@
           <a:bodyPr/>
           <a:lstStyle/>
           <a:p>
-            <a:endParaRPr lang="nl-NL"/>
+            <a:r>
+              <a:rPr lang="nl-NL" dirty="0" smtClean="0"/>
+              <a:t>A* -alg</a:t>
+            </a:r>
+            <a:endParaRPr lang="nl-NL" dirty="0"/>
           </a:p>
         </p:txBody>
       </p:sp>
@@ -5284,7 +5516,7 @@
         </p:blipFill>
         <p:spPr>
           <a:xfrm>
-            <a:off x="457200" y="848360"/>
+            <a:off x="457200" y="1417638"/>
             <a:ext cx="7620000" cy="4800600"/>
           </a:xfrm>
         </p:spPr>
@@ -5326,7 +5558,7 @@
   <p:timing>
     <p:tnLst>
       <p:par>
-        <p:cTn xmlns:p14="http://schemas.microsoft.com/office/powerpoint/2010/main" id="1" dur="indefinite" restart="never" nodeType="tmRoot"/>
+        <p:cTn id="1" dur="indefinite" restart="never" nodeType="tmRoot"/>
       </p:par>
     </p:tnLst>
   </p:timing>

</xml_diff>